<commit_message>
Improvements based on feedback
Signed-off-by: Sander Jansen <Sander3003@users.noreply.github.com>
</commit_message>
<xml_diff>
--- a/roadmap-docs/CoMPAS architecture overview 2023.pptx
+++ b/roadmap-docs/CoMPAS architecture overview 2023.pptx
@@ -6833,7 +6833,7 @@
                 <a:latin typeface="Arial" panose="020B0604020202020204" pitchFamily="34" charset="0"/>
                 <a:cs typeface="Arial" panose="020B0604020202020204" pitchFamily="34" charset="0"/>
               </a:rPr>
-              <a:t>Possibility to integrate third-part tools</a:t>
+              <a:t>Possibility to integrate third-party tools</a:t>
             </a:r>
           </a:p>
         </p:txBody>
@@ -7257,7 +7257,7 @@
         </p:blipFill>
         <p:spPr>
           <a:xfrm>
-            <a:off x="5547058" y="2239646"/>
+            <a:off x="3908603" y="2304298"/>
             <a:ext cx="1754124" cy="548164"/>
           </a:xfrm>
           <a:prstGeom prst="rect">
@@ -7853,6 +7853,15 @@
 </file>
 
 <file path=customXml/item2.xml><?xml version="1.0" encoding="utf-8"?>
+<?mso-contentType ?>
+<FormTemplates xmlns="http://schemas.microsoft.com/sharepoint/v3/contenttype/forms">
+  <Display>DocumentLibraryForm</Display>
+  <Edit>DocumentLibraryForm</Edit>
+  <New>DocumentLibraryForm</New>
+</FormTemplates>
+</file>
+
+<file path=customXml/item3.xml><?xml version="1.0" encoding="utf-8"?>
 <ct:contentTypeSchema xmlns:ct="http://schemas.microsoft.com/office/2006/metadata/contentType" xmlns:ma="http://schemas.microsoft.com/office/2006/metadata/properties/metaAttributes" ct:_="" ma:_="" ma:contentTypeName="Document" ma:contentTypeID="0x010100B8E3E32BF4729743B02F4C8693FB7908" ma:contentTypeVersion="12" ma:contentTypeDescription="Create a new document." ma:contentTypeScope="" ma:versionID="3e0f492865cb3c751c643fce921cc8fa">
   <xsd:schema xmlns:xsd="http://www.w3.org/2001/XMLSchema" xmlns:xs="http://www.w3.org/2001/XMLSchema" xmlns:p="http://schemas.microsoft.com/office/2006/metadata/properties" xmlns:ns3="e7eebcba-988e-498c-899d-a3b4259f0312" xmlns:ns4="093020be-362e-427e-bcba-5bfc522db69b" targetNamespace="http://schemas.microsoft.com/office/2006/metadata/properties" ma:root="true" ma:fieldsID="5bbabbdba72354330c02a7c54b2a7020" ns3:_="" ns4:_="">
     <xsd:import namespace="e7eebcba-988e-498c-899d-a3b4259f0312"/>
@@ -8069,15 +8078,6 @@
 </ct:contentTypeSchema>
 </file>
 
-<file path=customXml/item3.xml><?xml version="1.0" encoding="utf-8"?>
-<?mso-contentType ?>
-<FormTemplates xmlns="http://schemas.microsoft.com/sharepoint/v3/contenttype/forms">
-  <Display>DocumentLibraryForm</Display>
-  <Edit>DocumentLibraryForm</Edit>
-  <New>DocumentLibraryForm</New>
-</FormTemplates>
-</file>
-
 <file path=customXml/itemProps1.xml><?xml version="1.0" encoding="utf-8"?>
 <ds:datastoreItem xmlns:ds="http://schemas.openxmlformats.org/officeDocument/2006/customXml" ds:itemID="{FA141814-2E17-43BE-825B-E6FF967D2C19}">
   <ds:schemaRefs>
@@ -8096,6 +8096,14 @@
 </file>
 
 <file path=customXml/itemProps2.xml><?xml version="1.0" encoding="utf-8"?>
+<ds:datastoreItem xmlns:ds="http://schemas.openxmlformats.org/officeDocument/2006/customXml" ds:itemID="{07DB450A-8D36-4862-84CA-6677EABDCA54}">
+  <ds:schemaRefs>
+    <ds:schemaRef ds:uri="http://schemas.microsoft.com/sharepoint/v3/contenttype/forms"/>
+  </ds:schemaRefs>
+</ds:datastoreItem>
+</file>
+
+<file path=customXml/itemProps3.xml><?xml version="1.0" encoding="utf-8"?>
 <ds:datastoreItem xmlns:ds="http://schemas.openxmlformats.org/officeDocument/2006/customXml" ds:itemID="{3FDB9C31-C157-47E7-9FA8-12E1E6E9E8A5}">
   <ds:schemaRefs>
     <ds:schemaRef ds:uri="http://schemas.microsoft.com/office/2006/metadata/contentType"/>
@@ -8112,12 +8120,4 @@
     <ds:schemaRef ds:uri="http://schemas.microsoft.com/internal/obd"/>
   </ds:schemaRefs>
 </ds:datastoreItem>
-</file>
-
-<file path=customXml/itemProps3.xml><?xml version="1.0" encoding="utf-8"?>
-<ds:datastoreItem xmlns:ds="http://schemas.openxmlformats.org/officeDocument/2006/customXml" ds:itemID="{07DB450A-8D36-4862-84CA-6677EABDCA54}">
-  <ds:schemaRefs>
-    <ds:schemaRef ds:uri="http://schemas.microsoft.com/sharepoint/v3/contenttype/forms"/>
-  </ds:schemaRefs>
-</ds:datastoreItem>
 </file>
</xml_diff>